<commit_message>
List issue in upload model.
</commit_message>
<xml_diff>
--- a/docs/v6/api/overview/img/concepts.pptx
+++ b/docs/v6/api/overview/img/concepts.pptx
@@ -6,6 +6,7 @@
   </p:sldMasterIdLst>
   <p:sldIdLst>
     <p:sldId id="256" r:id="rId2"/>
+    <p:sldId id="258" r:id="rId3"/>
   </p:sldIdLst>
   <p:sldSz cx="9144000" cy="6858000" type="screen4x3"/>
   <p:notesSz cx="6858000" cy="9144000"/>
@@ -288,7 +289,7 @@
           <a:p>
             <a:fld id="{881D8425-6142-5542-A55B-2E6ECEFE6DA0}" type="datetimeFigureOut">
               <a:rPr kumimoji="1" lang="zh-CN" altLang="en-US" smtClean="0"/>
-              <a:t>13-11-27</a:t>
+              <a:t>14-1-9</a:t>
             </a:fld>
             <a:endParaRPr kumimoji="1" lang="zh-CN" altLang="en-US"/>
           </a:p>
@@ -458,7 +459,7 @@
           <a:p>
             <a:fld id="{881D8425-6142-5542-A55B-2E6ECEFE6DA0}" type="datetimeFigureOut">
               <a:rPr kumimoji="1" lang="zh-CN" altLang="en-US" smtClean="0"/>
-              <a:t>13-11-27</a:t>
+              <a:t>14-1-9</a:t>
             </a:fld>
             <a:endParaRPr kumimoji="1" lang="zh-CN" altLang="en-US"/>
           </a:p>
@@ -638,7 +639,7 @@
           <a:p>
             <a:fld id="{881D8425-6142-5542-A55B-2E6ECEFE6DA0}" type="datetimeFigureOut">
               <a:rPr kumimoji="1" lang="zh-CN" altLang="en-US" smtClean="0"/>
-              <a:t>13-11-27</a:t>
+              <a:t>14-1-9</a:t>
             </a:fld>
             <a:endParaRPr kumimoji="1" lang="zh-CN" altLang="en-US"/>
           </a:p>
@@ -808,7 +809,7 @@
           <a:p>
             <a:fld id="{881D8425-6142-5542-A55B-2E6ECEFE6DA0}" type="datetimeFigureOut">
               <a:rPr kumimoji="1" lang="zh-CN" altLang="en-US" smtClean="0"/>
-              <a:t>13-11-27</a:t>
+              <a:t>14-1-9</a:t>
             </a:fld>
             <a:endParaRPr kumimoji="1" lang="zh-CN" altLang="en-US"/>
           </a:p>
@@ -1054,7 +1055,7 @@
           <a:p>
             <a:fld id="{881D8425-6142-5542-A55B-2E6ECEFE6DA0}" type="datetimeFigureOut">
               <a:rPr kumimoji="1" lang="zh-CN" altLang="en-US" smtClean="0"/>
-              <a:t>13-11-27</a:t>
+              <a:t>14-1-9</a:t>
             </a:fld>
             <a:endParaRPr kumimoji="1" lang="zh-CN" altLang="en-US"/>
           </a:p>
@@ -1342,7 +1343,7 @@
           <a:p>
             <a:fld id="{881D8425-6142-5542-A55B-2E6ECEFE6DA0}" type="datetimeFigureOut">
               <a:rPr kumimoji="1" lang="zh-CN" altLang="en-US" smtClean="0"/>
-              <a:t>13-11-27</a:t>
+              <a:t>14-1-9</a:t>
             </a:fld>
             <a:endParaRPr kumimoji="1" lang="zh-CN" altLang="en-US"/>
           </a:p>
@@ -1764,7 +1765,7 @@
           <a:p>
             <a:fld id="{881D8425-6142-5542-A55B-2E6ECEFE6DA0}" type="datetimeFigureOut">
               <a:rPr kumimoji="1" lang="zh-CN" altLang="en-US" smtClean="0"/>
-              <a:t>13-11-27</a:t>
+              <a:t>14-1-9</a:t>
             </a:fld>
             <a:endParaRPr kumimoji="1" lang="zh-CN" altLang="en-US"/>
           </a:p>
@@ -1882,7 +1883,7 @@
           <a:p>
             <a:fld id="{881D8425-6142-5542-A55B-2E6ECEFE6DA0}" type="datetimeFigureOut">
               <a:rPr kumimoji="1" lang="zh-CN" altLang="en-US" smtClean="0"/>
-              <a:t>13-11-27</a:t>
+              <a:t>14-1-9</a:t>
             </a:fld>
             <a:endParaRPr kumimoji="1" lang="zh-CN" altLang="en-US"/>
           </a:p>
@@ -1977,7 +1978,7 @@
           <a:p>
             <a:fld id="{881D8425-6142-5542-A55B-2E6ECEFE6DA0}" type="datetimeFigureOut">
               <a:rPr kumimoji="1" lang="zh-CN" altLang="en-US" smtClean="0"/>
-              <a:t>13-11-27</a:t>
+              <a:t>14-1-9</a:t>
             </a:fld>
             <a:endParaRPr kumimoji="1" lang="zh-CN" altLang="en-US"/>
           </a:p>
@@ -2254,7 +2255,7 @@
           <a:p>
             <a:fld id="{881D8425-6142-5542-A55B-2E6ECEFE6DA0}" type="datetimeFigureOut">
               <a:rPr kumimoji="1" lang="zh-CN" altLang="en-US" smtClean="0"/>
-              <a:t>13-11-27</a:t>
+              <a:t>14-1-9</a:t>
             </a:fld>
             <a:endParaRPr kumimoji="1" lang="zh-CN" altLang="en-US"/>
           </a:p>
@@ -2507,7 +2508,7 @@
           <a:p>
             <a:fld id="{881D8425-6142-5542-A55B-2E6ECEFE6DA0}" type="datetimeFigureOut">
               <a:rPr kumimoji="1" lang="zh-CN" altLang="en-US" smtClean="0"/>
-              <a:t>13-11-27</a:t>
+              <a:t>14-1-9</a:t>
             </a:fld>
             <a:endParaRPr kumimoji="1" lang="zh-CN" altLang="en-US"/>
           </a:p>
@@ -2720,7 +2721,7 @@
           <a:p>
             <a:fld id="{881D8425-6142-5542-A55B-2E6ECEFE6DA0}" type="datetimeFigureOut">
               <a:rPr kumimoji="1" lang="zh-CN" altLang="en-US" smtClean="0"/>
-              <a:t>13-11-27</a:t>
+              <a:t>14-1-9</a:t>
             </a:fld>
             <a:endParaRPr kumimoji="1" lang="zh-CN" altLang="en-US"/>
           </a:p>
@@ -3680,6 +3681,632 @@
     <p:extLst>
       <p:ext uri="{BB962C8B-B14F-4D97-AF65-F5344CB8AC3E}">
         <p14:creationId xmlns:p14="http://schemas.microsoft.com/office/powerpoint/2010/main" val="463007064"/>
+      </p:ext>
+    </p:extLst>
+  </p:cSld>
+  <p:clrMapOvr>
+    <a:masterClrMapping/>
+  </p:clrMapOvr>
+</p:sld>
+</file>
+
+<file path=ppt/slides/slide2.xml><?xml version="1.0" encoding="utf-8"?>
+<p:sld xmlns:a="http://schemas.openxmlformats.org/drawingml/2006/main" xmlns:r="http://schemas.openxmlformats.org/officeDocument/2006/relationships" xmlns:p="http://schemas.openxmlformats.org/presentationml/2006/main">
+  <p:cSld>
+    <p:spTree>
+      <p:nvGrpSpPr>
+        <p:cNvPr id="1" name=""/>
+        <p:cNvGrpSpPr/>
+        <p:nvPr/>
+      </p:nvGrpSpPr>
+      <p:grpSpPr>
+        <a:xfrm>
+          <a:off x="0" y="0"/>
+          <a:ext cx="0" cy="0"/>
+          <a:chOff x="0" y="0"/>
+          <a:chExt cx="0" cy="0"/>
+        </a:xfrm>
+      </p:grpSpPr>
+      <p:pic>
+        <p:nvPicPr>
+          <p:cNvPr id="5" name="图片 4"/>
+          <p:cNvPicPr>
+            <a:picLocks noChangeAspect="1"/>
+          </p:cNvPicPr>
+          <p:nvPr/>
+        </p:nvPicPr>
+        <p:blipFill rotWithShape="1">
+          <a:blip r:embed="rId2"/>
+          <a:srcRect l="30587" r="31663"/>
+          <a:stretch/>
+        </p:blipFill>
+        <p:spPr>
+          <a:xfrm>
+            <a:off x="4367545" y="2554638"/>
+            <a:ext cx="1216048" cy="2577077"/>
+          </a:xfrm>
+          <a:prstGeom prst="rect">
+            <a:avLst/>
+          </a:prstGeom>
+        </p:spPr>
+      </p:pic>
+      <p:sp>
+        <p:nvSpPr>
+          <p:cNvPr id="4" name="云形 3"/>
+          <p:cNvSpPr/>
+          <p:nvPr/>
+        </p:nvSpPr>
+        <p:spPr>
+          <a:xfrm>
+            <a:off x="261598" y="391717"/>
+            <a:ext cx="3391927" cy="2004809"/>
+          </a:xfrm>
+          <a:prstGeom prst="cloud">
+            <a:avLst/>
+          </a:prstGeom>
+          <a:solidFill>
+            <a:srgbClr val="FFFFFF"/>
+          </a:solidFill>
+          <a:ln>
+            <a:solidFill>
+              <a:schemeClr val="accent1"/>
+            </a:solidFill>
+          </a:ln>
+        </p:spPr>
+        <p:style>
+          <a:lnRef idx="2">
+            <a:schemeClr val="dk1"/>
+          </a:lnRef>
+          <a:fillRef idx="1">
+            <a:schemeClr val="lt1"/>
+          </a:fillRef>
+          <a:effectRef idx="0">
+            <a:schemeClr val="dk1"/>
+          </a:effectRef>
+          <a:fontRef idx="minor">
+            <a:schemeClr val="dk1"/>
+          </a:fontRef>
+        </p:style>
+        <p:txBody>
+          <a:bodyPr rtlCol="0" anchor="ctr"/>
+          <a:lstStyle/>
+          <a:p>
+            <a:pPr algn="ctr"/>
+            <a:r>
+              <a:rPr kumimoji="1" lang="en-US" altLang="zh-CN" dirty="0" smtClean="0">
+                <a:latin typeface="Arial"/>
+                <a:ea typeface="Hei"/>
+                <a:cs typeface="Arial"/>
+              </a:rPr>
+              <a:t>Qiniu </a:t>
+            </a:r>
+          </a:p>
+          <a:p>
+            <a:pPr algn="ctr"/>
+            <a:r>
+              <a:rPr kumimoji="1" lang="en-US" altLang="zh-CN" dirty="0" smtClean="0">
+                <a:latin typeface="Arial"/>
+                <a:ea typeface="Hei"/>
+                <a:cs typeface="Arial"/>
+              </a:rPr>
+              <a:t>Data Management Services</a:t>
+            </a:r>
+            <a:endParaRPr kumimoji="1" lang="zh-CN" altLang="en-US" dirty="0">
+              <a:latin typeface="Arial"/>
+              <a:ea typeface="Hei"/>
+              <a:cs typeface="Arial"/>
+            </a:endParaRPr>
+          </a:p>
+        </p:txBody>
+      </p:sp>
+      <p:cxnSp>
+        <p:nvCxnSpPr>
+          <p:cNvPr id="15" name="直线箭头连接符 14"/>
+          <p:cNvCxnSpPr/>
+          <p:nvPr/>
+        </p:nvCxnSpPr>
+        <p:spPr>
+          <a:xfrm flipH="1" flipV="1">
+            <a:off x="3238123" y="1849921"/>
+            <a:ext cx="1304687" cy="892646"/>
+          </a:xfrm>
+          <a:prstGeom prst="straightConnector1">
+            <a:avLst/>
+          </a:prstGeom>
+          <a:ln w="28575" cmpd="sng">
+            <a:headEnd type="none"/>
+            <a:tailEnd type="arrow"/>
+          </a:ln>
+        </p:spPr>
+        <p:style>
+          <a:lnRef idx="1">
+            <a:schemeClr val="dk1"/>
+          </a:lnRef>
+          <a:fillRef idx="0">
+            <a:schemeClr val="dk1"/>
+          </a:fillRef>
+          <a:effectRef idx="0">
+            <a:schemeClr val="dk1"/>
+          </a:effectRef>
+          <a:fontRef idx="minor">
+            <a:schemeClr val="tx1"/>
+          </a:fontRef>
+        </p:style>
+      </p:cxnSp>
+      <p:sp>
+        <p:nvSpPr>
+          <p:cNvPr id="28" name="文本框 27"/>
+          <p:cNvSpPr txBox="1"/>
+          <p:nvPr/>
+        </p:nvSpPr>
+        <p:spPr>
+          <a:xfrm>
+            <a:off x="3238123" y="2146750"/>
+            <a:ext cx="2359966" cy="307777"/>
+          </a:xfrm>
+          <a:prstGeom prst="rect">
+            <a:avLst/>
+          </a:prstGeom>
+          <a:solidFill>
+            <a:srgbClr val="FFFFFF"/>
+          </a:solidFill>
+        </p:spPr>
+        <p:txBody>
+          <a:bodyPr wrap="none" rtlCol="0">
+            <a:spAutoFit/>
+          </a:bodyPr>
+          <a:lstStyle/>
+          <a:p>
+            <a:r>
+              <a:rPr kumimoji="1" lang="en-US" altLang="zh-CN" sz="1400" dirty="0" smtClean="0">
+                <a:latin typeface="Arial"/>
+                <a:ea typeface="Hei"/>
+                <a:cs typeface="Arial"/>
+              </a:rPr>
+              <a:t>Apps rely on Qiniu services</a:t>
+            </a:r>
+            <a:endParaRPr kumimoji="1" lang="zh-CN" altLang="en-US" sz="1400" dirty="0">
+              <a:latin typeface="Arial"/>
+              <a:ea typeface="Hei"/>
+              <a:cs typeface="Arial"/>
+            </a:endParaRPr>
+          </a:p>
+        </p:txBody>
+      </p:sp>
+      <p:pic>
+        <p:nvPicPr>
+          <p:cNvPr id="2" name="图片 1"/>
+          <p:cNvPicPr>
+            <a:picLocks noChangeAspect="1"/>
+          </p:cNvPicPr>
+          <p:nvPr/>
+        </p:nvPicPr>
+        <p:blipFill>
+          <a:blip r:embed="rId3"/>
+          <a:stretch>
+            <a:fillRect/>
+          </a:stretch>
+        </p:blipFill>
+        <p:spPr>
+          <a:xfrm>
+            <a:off x="7378054" y="5131715"/>
+            <a:ext cx="966052" cy="966052"/>
+          </a:xfrm>
+          <a:prstGeom prst="rect">
+            <a:avLst/>
+          </a:prstGeom>
+        </p:spPr>
+      </p:pic>
+      <p:sp>
+        <p:nvSpPr>
+          <p:cNvPr id="21" name="文本框 20"/>
+          <p:cNvSpPr txBox="1"/>
+          <p:nvPr/>
+        </p:nvSpPr>
+        <p:spPr>
+          <a:xfrm>
+            <a:off x="7202828" y="6264657"/>
+            <a:ext cx="1300356" cy="400110"/>
+          </a:xfrm>
+          <a:prstGeom prst="rect">
+            <a:avLst/>
+          </a:prstGeom>
+          <a:noFill/>
+        </p:spPr>
+        <p:txBody>
+          <a:bodyPr wrap="none" rtlCol="0">
+            <a:spAutoFit/>
+          </a:bodyPr>
+          <a:lstStyle/>
+          <a:p>
+            <a:pPr algn="ctr"/>
+            <a:r>
+              <a:rPr kumimoji="1" lang="en-US" altLang="zh-CN" sz="2000" dirty="0" smtClean="0">
+                <a:latin typeface="Arial"/>
+                <a:ea typeface="Hei"/>
+                <a:cs typeface="Arial"/>
+              </a:rPr>
+              <a:t>End User</a:t>
+            </a:r>
+            <a:endParaRPr kumimoji="1" lang="zh-CN" altLang="en-US" sz="2000" dirty="0">
+              <a:latin typeface="Arial"/>
+              <a:ea typeface="Hei"/>
+              <a:cs typeface="Arial"/>
+            </a:endParaRPr>
+          </a:p>
+        </p:txBody>
+      </p:sp>
+      <p:sp>
+        <p:nvSpPr>
+          <p:cNvPr id="12" name="文本框 11"/>
+          <p:cNvSpPr txBox="1"/>
+          <p:nvPr/>
+        </p:nvSpPr>
+        <p:spPr>
+          <a:xfrm>
+            <a:off x="4542810" y="3735186"/>
+            <a:ext cx="920582" cy="276999"/>
+          </a:xfrm>
+          <a:prstGeom prst="rect">
+            <a:avLst/>
+          </a:prstGeom>
+          <a:noFill/>
+        </p:spPr>
+        <p:txBody>
+          <a:bodyPr wrap="square" rtlCol="0">
+            <a:spAutoFit/>
+          </a:bodyPr>
+          <a:lstStyle/>
+          <a:p>
+            <a:pPr algn="ctr"/>
+            <a:r>
+              <a:rPr kumimoji="1" lang="en-US" altLang="zh-CN" sz="1200" b="1" dirty="0" smtClean="0">
+                <a:latin typeface="Arial"/>
+                <a:ea typeface="Hei"/>
+                <a:cs typeface="Arial"/>
+              </a:rPr>
+              <a:t>Apps</a:t>
+            </a:r>
+            <a:endParaRPr kumimoji="1" lang="zh-CN" altLang="en-US" sz="1200" b="1" dirty="0">
+              <a:latin typeface="Arial"/>
+              <a:ea typeface="Hei"/>
+              <a:cs typeface="Arial"/>
+            </a:endParaRPr>
+          </a:p>
+        </p:txBody>
+      </p:sp>
+      <p:pic>
+        <p:nvPicPr>
+          <p:cNvPr id="14" name="图片 13"/>
+          <p:cNvPicPr>
+            <a:picLocks noChangeAspect="1"/>
+          </p:cNvPicPr>
+          <p:nvPr/>
+        </p:nvPicPr>
+        <p:blipFill>
+          <a:blip r:embed="rId4"/>
+          <a:stretch>
+            <a:fillRect/>
+          </a:stretch>
+        </p:blipFill>
+        <p:spPr>
+          <a:xfrm>
+            <a:off x="4768791" y="3298707"/>
+            <a:ext cx="418287" cy="418287"/>
+          </a:xfrm>
+          <a:prstGeom prst="rect">
+            <a:avLst/>
+          </a:prstGeom>
+        </p:spPr>
+      </p:pic>
+      <p:cxnSp>
+        <p:nvCxnSpPr>
+          <p:cNvPr id="31" name="直线箭头连接符 30"/>
+          <p:cNvCxnSpPr>
+            <a:stCxn id="2" idx="1"/>
+          </p:cNvCxnSpPr>
+          <p:nvPr/>
+        </p:nvCxnSpPr>
+        <p:spPr>
+          <a:xfrm flipH="1" flipV="1">
+            <a:off x="5495276" y="4545927"/>
+            <a:ext cx="1882778" cy="1068814"/>
+          </a:xfrm>
+          <a:prstGeom prst="straightConnector1">
+            <a:avLst/>
+          </a:prstGeom>
+          <a:ln w="28575" cmpd="sng">
+            <a:headEnd type="none"/>
+            <a:tailEnd type="arrow"/>
+          </a:ln>
+        </p:spPr>
+        <p:style>
+          <a:lnRef idx="1">
+            <a:schemeClr val="dk1"/>
+          </a:lnRef>
+          <a:fillRef idx="0">
+            <a:schemeClr val="dk1"/>
+          </a:fillRef>
+          <a:effectRef idx="0">
+            <a:schemeClr val="dk1"/>
+          </a:effectRef>
+          <a:fontRef idx="minor">
+            <a:schemeClr val="tx1"/>
+          </a:fontRef>
+        </p:style>
+      </p:cxnSp>
+      <p:pic>
+        <p:nvPicPr>
+          <p:cNvPr id="32" name="图片 31"/>
+          <p:cNvPicPr>
+            <a:picLocks noChangeAspect="1"/>
+          </p:cNvPicPr>
+          <p:nvPr/>
+        </p:nvPicPr>
+        <p:blipFill>
+          <a:blip r:embed="rId5"/>
+          <a:stretch>
+            <a:fillRect/>
+          </a:stretch>
+        </p:blipFill>
+        <p:spPr>
+          <a:xfrm>
+            <a:off x="261598" y="4261983"/>
+            <a:ext cx="2002674" cy="2002674"/>
+          </a:xfrm>
+          <a:prstGeom prst="rect">
+            <a:avLst/>
+          </a:prstGeom>
+        </p:spPr>
+      </p:pic>
+      <p:cxnSp>
+        <p:nvCxnSpPr>
+          <p:cNvPr id="34" name="直线箭头连接符 33"/>
+          <p:cNvCxnSpPr>
+            <a:stCxn id="32" idx="3"/>
+            <a:endCxn id="5" idx="1"/>
+          </p:cNvCxnSpPr>
+          <p:nvPr/>
+        </p:nvCxnSpPr>
+        <p:spPr>
+          <a:xfrm flipV="1">
+            <a:off x="2264272" y="3843177"/>
+            <a:ext cx="2103273" cy="1420143"/>
+          </a:xfrm>
+          <a:prstGeom prst="straightConnector1">
+            <a:avLst/>
+          </a:prstGeom>
+          <a:ln w="28575" cmpd="sng">
+            <a:headEnd type="none"/>
+            <a:tailEnd type="arrow"/>
+          </a:ln>
+        </p:spPr>
+        <p:style>
+          <a:lnRef idx="1">
+            <a:schemeClr val="dk1"/>
+          </a:lnRef>
+          <a:fillRef idx="0">
+            <a:schemeClr val="dk1"/>
+          </a:fillRef>
+          <a:effectRef idx="0">
+            <a:schemeClr val="dk1"/>
+          </a:effectRef>
+          <a:fontRef idx="minor">
+            <a:schemeClr val="tx1"/>
+          </a:fontRef>
+        </p:style>
+      </p:cxnSp>
+      <p:sp>
+        <p:nvSpPr>
+          <p:cNvPr id="37" name="文本框 36"/>
+          <p:cNvSpPr txBox="1"/>
+          <p:nvPr/>
+        </p:nvSpPr>
+        <p:spPr>
+          <a:xfrm>
+            <a:off x="1977617" y="4599046"/>
+            <a:ext cx="2320780" cy="523220"/>
+          </a:xfrm>
+          <a:prstGeom prst="rect">
+            <a:avLst/>
+          </a:prstGeom>
+          <a:solidFill>
+            <a:srgbClr val="FFFFFF"/>
+          </a:solidFill>
+        </p:spPr>
+        <p:txBody>
+          <a:bodyPr wrap="none" rtlCol="0">
+            <a:spAutoFit/>
+          </a:bodyPr>
+          <a:lstStyle/>
+          <a:p>
+            <a:pPr algn="ctr"/>
+            <a:r>
+              <a:rPr kumimoji="1" lang="en-US" altLang="zh-CN" sz="1400" dirty="0" smtClean="0">
+                <a:latin typeface="Arial"/>
+                <a:ea typeface="Hei"/>
+                <a:cs typeface="Arial"/>
+              </a:rPr>
+              <a:t>Developing Apps based on </a:t>
+            </a:r>
+          </a:p>
+          <a:p>
+            <a:pPr algn="ctr"/>
+            <a:r>
+              <a:rPr kumimoji="1" lang="en-US" altLang="zh-CN" sz="1400" dirty="0" smtClean="0">
+                <a:latin typeface="Arial"/>
+                <a:ea typeface="Hei"/>
+                <a:cs typeface="Arial"/>
+              </a:rPr>
+              <a:t>Qiniu services</a:t>
+            </a:r>
+            <a:endParaRPr kumimoji="1" lang="zh-CN" altLang="en-US" sz="1400" dirty="0">
+              <a:latin typeface="Arial"/>
+              <a:ea typeface="Hei"/>
+              <a:cs typeface="Arial"/>
+            </a:endParaRPr>
+          </a:p>
+        </p:txBody>
+      </p:sp>
+      <p:sp>
+        <p:nvSpPr>
+          <p:cNvPr id="39" name="文本框 38"/>
+          <p:cNvSpPr txBox="1"/>
+          <p:nvPr/>
+        </p:nvSpPr>
+        <p:spPr>
+          <a:xfrm>
+            <a:off x="6402131" y="4688062"/>
+            <a:ext cx="1092867" cy="307777"/>
+          </a:xfrm>
+          <a:prstGeom prst="rect">
+            <a:avLst/>
+          </a:prstGeom>
+          <a:noFill/>
+        </p:spPr>
+        <p:txBody>
+          <a:bodyPr wrap="none" rtlCol="0">
+            <a:spAutoFit/>
+          </a:bodyPr>
+          <a:lstStyle/>
+          <a:p>
+            <a:r>
+              <a:rPr kumimoji="1" lang="en-US" altLang="zh-CN" sz="1400" dirty="0" smtClean="0">
+                <a:latin typeface="Arial"/>
+                <a:ea typeface="Hei"/>
+                <a:cs typeface="Arial"/>
+              </a:rPr>
+              <a:t>Using Apps</a:t>
+            </a:r>
+            <a:endParaRPr kumimoji="1" lang="zh-CN" altLang="en-US" sz="1400" dirty="0">
+              <a:latin typeface="Arial"/>
+              <a:ea typeface="Hei"/>
+              <a:cs typeface="Arial"/>
+            </a:endParaRPr>
+          </a:p>
+        </p:txBody>
+      </p:sp>
+      <p:sp>
+        <p:nvSpPr>
+          <p:cNvPr id="40" name="文本框 39"/>
+          <p:cNvSpPr txBox="1"/>
+          <p:nvPr/>
+        </p:nvSpPr>
+        <p:spPr>
+          <a:xfrm>
+            <a:off x="559074" y="6235017"/>
+            <a:ext cx="1364476" cy="400110"/>
+          </a:xfrm>
+          <a:prstGeom prst="rect">
+            <a:avLst/>
+          </a:prstGeom>
+          <a:noFill/>
+        </p:spPr>
+        <p:txBody>
+          <a:bodyPr wrap="none" rtlCol="0">
+            <a:spAutoFit/>
+          </a:bodyPr>
+          <a:lstStyle/>
+          <a:p>
+            <a:pPr algn="ctr"/>
+            <a:r>
+              <a:rPr kumimoji="1" lang="en-US" altLang="zh-CN" sz="2000" dirty="0" smtClean="0">
+                <a:latin typeface="Arial"/>
+                <a:ea typeface="Hei"/>
+                <a:cs typeface="Arial"/>
+              </a:rPr>
+              <a:t>Developer</a:t>
+            </a:r>
+            <a:endParaRPr kumimoji="1" lang="zh-CN" altLang="en-US" sz="2000" dirty="0">
+              <a:latin typeface="Arial"/>
+              <a:ea typeface="Hei"/>
+              <a:cs typeface="Arial"/>
+            </a:endParaRPr>
+          </a:p>
+        </p:txBody>
+      </p:sp>
+      <p:cxnSp>
+        <p:nvCxnSpPr>
+          <p:cNvPr id="41" name="直线箭头连接符 40"/>
+          <p:cNvCxnSpPr>
+            <a:stCxn id="2" idx="0"/>
+            <a:endCxn id="4" idx="0"/>
+          </p:cNvCxnSpPr>
+          <p:nvPr/>
+        </p:nvCxnSpPr>
+        <p:spPr>
+          <a:xfrm rot="16200000" flipV="1">
+            <a:off x="3887093" y="1157728"/>
+            <a:ext cx="3737593" cy="4210382"/>
+          </a:xfrm>
+          <a:prstGeom prst="curvedConnector2">
+            <a:avLst/>
+          </a:prstGeom>
+          <a:ln w="28575" cmpd="sng">
+            <a:prstDash val="dash"/>
+            <a:headEnd type="none"/>
+            <a:tailEnd type="arrow"/>
+          </a:ln>
+        </p:spPr>
+        <p:style>
+          <a:lnRef idx="1">
+            <a:schemeClr val="dk1"/>
+          </a:lnRef>
+          <a:fillRef idx="0">
+            <a:schemeClr val="dk1"/>
+          </a:fillRef>
+          <a:effectRef idx="0">
+            <a:schemeClr val="dk1"/>
+          </a:effectRef>
+          <a:fontRef idx="minor">
+            <a:schemeClr val="tx1"/>
+          </a:fontRef>
+        </p:style>
+      </p:cxnSp>
+      <p:sp>
+        <p:nvSpPr>
+          <p:cNvPr id="43" name="文本框 42"/>
+          <p:cNvSpPr txBox="1"/>
+          <p:nvPr/>
+        </p:nvSpPr>
+        <p:spPr>
+          <a:xfrm>
+            <a:off x="5583593" y="2434790"/>
+            <a:ext cx="2998512" cy="307777"/>
+          </a:xfrm>
+          <a:prstGeom prst="rect">
+            <a:avLst/>
+          </a:prstGeom>
+          <a:solidFill>
+            <a:schemeClr val="bg1"/>
+          </a:solidFill>
+        </p:spPr>
+        <p:txBody>
+          <a:bodyPr wrap="none" rtlCol="0">
+            <a:spAutoFit/>
+          </a:bodyPr>
+          <a:lstStyle/>
+          <a:p>
+            <a:r>
+              <a:rPr kumimoji="1" lang="en-US" altLang="zh-CN" sz="1400" dirty="0" smtClean="0">
+                <a:latin typeface="Arial"/>
+                <a:ea typeface="Hei"/>
+                <a:cs typeface="Arial"/>
+              </a:rPr>
+              <a:t>Indirectly consuming Qiniu services</a:t>
+            </a:r>
+            <a:endParaRPr kumimoji="1" lang="zh-CN" altLang="en-US" sz="1400" dirty="0">
+              <a:latin typeface="Arial"/>
+              <a:ea typeface="Hei"/>
+              <a:cs typeface="Arial"/>
+            </a:endParaRPr>
+          </a:p>
+        </p:txBody>
+      </p:sp>
+    </p:spTree>
+    <p:extLst>
+      <p:ext uri="{BB962C8B-B14F-4D97-AF65-F5344CB8AC3E}">
+        <p14:creationId xmlns:p14="http://schemas.microsoft.com/office/powerpoint/2010/main" val="1244072336"/>
       </p:ext>
     </p:extLst>
   </p:cSld>

</xml_diff>